<commit_message>
Final commit for the presentation
</commit_message>
<xml_diff>
--- a/MTA_LOW_TRAFFIC_WEEK_FOR_KIDS_TOURNAMENTS.pptx
+++ b/MTA_LOW_TRAFFIC_WEEK_FOR_KIDS_TOURNAMENTS.pptx
@@ -908,7 +908,7 @@
             </a:pPr>
             <a:r>
               <a:rPr lang="en-GB"/>
-              <a:t>MTA is the backbone of the New York Public transportation. Millions of people rely on it as their transportation mechanism.</a:t>
+              <a:t>MTA is the backbone of the New York Public transportation with millions of people relying on it.</a:t>
             </a:r>
             <a:endParaRPr/>
           </a:p>
@@ -993,7 +993,7 @@
                   <a:schemeClr val="dk1"/>
                 </a:solidFill>
               </a:rPr>
-              <a:t>New York school department is planning to host sports competition for middle school students at Barclays center. </a:t>
+              <a:t>New York school department is planning to host sports competition for middle school students at Barclays center for the year 2020</a:t>
             </a:r>
             <a:endParaRPr>
               <a:solidFill>
@@ -1041,7 +1041,7 @@
                   <a:schemeClr val="dk1"/>
                 </a:solidFill>
               </a:rPr>
-              <a:t>            3.a     This will be held during the summer time. It is estimated that around 5000 students along with families will travel to Barclays center to attend the event.</a:t>
+              <a:t>            3.a     This event will be held during the summer time. It is estimated that around 5000 students along with families will be attending it and travelling to Barclays center.</a:t>
             </a:r>
             <a:endParaRPr>
               <a:solidFill>
@@ -1089,26 +1089,7 @@
                   <a:schemeClr val="dk1"/>
                 </a:solidFill>
               </a:rPr>
-              <a:t>            3.b.    They will most likely use MTA as the transport mechanism. The 7 closest stations within walking distance to Barclays center will be most likely be used by the student.</a:t>
-            </a:r>
-            <a:endParaRPr>
-              <a:solidFill>
-                <a:schemeClr val="dk1"/>
-              </a:solidFill>
-            </a:endParaRPr>
-          </a:p>
-          <a:p>
-            <a:pPr indent="0" lvl="0" marL="0" rtl="0" algn="l">
-              <a:spcBef>
-                <a:spcPts val="0"/>
-              </a:spcBef>
-              <a:spcAft>
-                <a:spcPts val="0"/>
-              </a:spcAft>
-              <a:buNone/>
-            </a:pPr>
-            <a:r>
-              <a:t/>
+              <a:t>            3.b.    Majority of them will use MTA as the transport mechanism and most likely use 7 closest stations which are within walking distance to Barclays center. </a:t>
             </a:r>
             <a:endParaRPr>
               <a:solidFill>
@@ -1179,7 +1160,7 @@
                   <a:schemeClr val="dk1"/>
                 </a:solidFill>
               </a:rPr>
-              <a:t>New York School department wants to establish a MTA ridership pattern for summer season for the 7 closest station to barclays center. In order to establish a pattern, goal is to analyze last 3 years worth of Turnstile data for summer.</a:t>
+              <a:t>To make this event as convenient as possible to the student, New York School department wants to establish a MTA ridership pattern for summer season. Objective here is to analyze last 3 years worth of Turnstile data for summer.</a:t>
             </a:r>
             <a:endParaRPr>
               <a:solidFill>
@@ -1269,7 +1250,7 @@
                   <a:schemeClr val="dk1"/>
                 </a:solidFill>
               </a:rPr>
-              <a:t>The goal here is to establish the best week for the kids  to travel to barclays center via the 7 closest stations  </a:t>
+              <a:t>From the last 3 year worth of summer data, the goal here is to establish the best week for the kids to travel to barclays center via the 7 closest stations  </a:t>
             </a:r>
             <a:endParaRPr>
               <a:solidFill>
@@ -1297,7 +1278,7 @@
                   <a:schemeClr val="dk1"/>
                 </a:solidFill>
               </a:rPr>
-              <a:t>As this event will be held in 2022, this established week will be used by the New Yourk Schook Department to plan for additional security, transport etc.</a:t>
+              <a:t>As this event will be held in 2022, this suggested week will be used by the New York School Department to plan for additional security, transportation etc.</a:t>
             </a:r>
             <a:endParaRPr>
               <a:solidFill>
@@ -1400,6 +1381,362 @@
               <a:buNone/>
             </a:pPr>
             <a:r>
+              <a:rPr lang="en-GB"/>
+              <a:t>&lt;Click&gt; </a:t>
+            </a:r>
+            <a:r>
+              <a:rPr b="1" lang="en-GB"/>
+              <a:t>Data Collection</a:t>
+            </a:r>
+            <a:endParaRPr b="1"/>
+          </a:p>
+          <a:p>
+            <a:pPr indent="0" lvl="0" marL="0" rtl="0" algn="l">
+              <a:spcBef>
+                <a:spcPts val="0"/>
+              </a:spcBef>
+              <a:spcAft>
+                <a:spcPts val="0"/>
+              </a:spcAft>
+              <a:buNone/>
+            </a:pPr>
+            <a:r>
+              <a:rPr lang="en-GB"/>
+              <a:t>For the data collection, we used the MTA turnstile data for the year of 2018, 2019 and 2021. As the event will be held in summer season, only May, June and July data was used.</a:t>
+            </a:r>
+            <a:r>
+              <a:rPr lang="en-GB">
+                <a:solidFill>
+                  <a:schemeClr val="dk1"/>
+                </a:solidFill>
+              </a:rPr>
+              <a:t> Year 2020 data was not used due to pandemic.</a:t>
+            </a:r>
+            <a:endParaRPr/>
+          </a:p>
+          <a:p>
+            <a:pPr indent="0" lvl="0" marL="0" rtl="0" algn="l">
+              <a:spcBef>
+                <a:spcPts val="0"/>
+              </a:spcBef>
+              <a:spcAft>
+                <a:spcPts val="0"/>
+              </a:spcAft>
+              <a:buNone/>
+            </a:pPr>
+            <a:r>
+              <a:t/>
+            </a:r>
+            <a:endParaRPr/>
+          </a:p>
+          <a:p>
+            <a:pPr indent="0" lvl="0" marL="0" rtl="0" algn="l">
+              <a:spcBef>
+                <a:spcPts val="0"/>
+              </a:spcBef>
+              <a:spcAft>
+                <a:spcPts val="0"/>
+              </a:spcAft>
+              <a:buNone/>
+            </a:pPr>
+            <a:r>
+              <a:rPr lang="en-GB"/>
+              <a:t>&lt;Click&gt;</a:t>
+            </a:r>
+            <a:endParaRPr/>
+          </a:p>
+          <a:p>
+            <a:pPr indent="0" lvl="0" marL="0" rtl="0" algn="l">
+              <a:spcBef>
+                <a:spcPts val="0"/>
+              </a:spcBef>
+              <a:spcAft>
+                <a:spcPts val="0"/>
+              </a:spcAft>
+              <a:buNone/>
+            </a:pPr>
+            <a:r>
+              <a:rPr lang="en-GB"/>
+              <a:t>After this, the data for filtered only for the 7 </a:t>
+            </a:r>
+            <a:r>
+              <a:rPr lang="en-GB"/>
+              <a:t>closets</a:t>
+            </a:r>
+            <a:r>
+              <a:rPr lang="en-GB"/>
+              <a:t> stations to Barclays Center.</a:t>
+            </a:r>
+            <a:endParaRPr/>
+          </a:p>
+          <a:p>
+            <a:pPr indent="0" lvl="0" marL="0" rtl="0" algn="l">
+              <a:spcBef>
+                <a:spcPts val="0"/>
+              </a:spcBef>
+              <a:spcAft>
+                <a:spcPts val="0"/>
+              </a:spcAft>
+              <a:buNone/>
+            </a:pPr>
+            <a:r>
+              <a:t/>
+            </a:r>
+            <a:endParaRPr/>
+          </a:p>
+          <a:p>
+            <a:pPr indent="0" lvl="0" marL="0" rtl="0" algn="l">
+              <a:spcBef>
+                <a:spcPts val="0"/>
+              </a:spcBef>
+              <a:spcAft>
+                <a:spcPts val="0"/>
+              </a:spcAft>
+              <a:buNone/>
+            </a:pPr>
+            <a:r>
+              <a:rPr lang="en-GB"/>
+              <a:t>&lt;Click&gt;</a:t>
+            </a:r>
+            <a:endParaRPr/>
+          </a:p>
+          <a:p>
+            <a:pPr indent="0" lvl="0" marL="0" rtl="0" algn="l">
+              <a:spcBef>
+                <a:spcPts val="0"/>
+              </a:spcBef>
+              <a:spcAft>
+                <a:spcPts val="0"/>
+              </a:spcAft>
+              <a:buNone/>
+            </a:pPr>
+            <a:r>
+              <a:t/>
+            </a:r>
+            <a:endParaRPr/>
+          </a:p>
+          <a:p>
+            <a:pPr indent="0" lvl="0" marL="0" rtl="0" algn="l">
+              <a:spcBef>
+                <a:spcPts val="0"/>
+              </a:spcBef>
+              <a:spcAft>
+                <a:spcPts val="0"/>
+              </a:spcAft>
+              <a:buNone/>
+            </a:pPr>
+            <a:r>
+              <a:rPr lang="en-GB"/>
+              <a:t>&lt;Click&gt; </a:t>
+            </a:r>
+            <a:r>
+              <a:rPr b="1" lang="en-GB"/>
+              <a:t>Data Exploration </a:t>
+            </a:r>
+            <a:endParaRPr b="1"/>
+          </a:p>
+          <a:p>
+            <a:pPr indent="0" lvl="0" marL="0" rtl="0" algn="l">
+              <a:spcBef>
+                <a:spcPts val="0"/>
+              </a:spcBef>
+              <a:spcAft>
+                <a:spcPts val="0"/>
+              </a:spcAft>
+              <a:buNone/>
+            </a:pPr>
+            <a:r>
+              <a:rPr lang="en-GB"/>
+              <a:t>This collected data was then explored in iterative fashion to understand it better. Understanding data included things such as how to identify a unique turnstile, understand patterns of data collection such as frequency etc.</a:t>
+            </a:r>
+            <a:endParaRPr/>
+          </a:p>
+          <a:p>
+            <a:pPr indent="0" lvl="0" marL="0" rtl="0" algn="l">
+              <a:spcBef>
+                <a:spcPts val="0"/>
+              </a:spcBef>
+              <a:spcAft>
+                <a:spcPts val="0"/>
+              </a:spcAft>
+              <a:buNone/>
+            </a:pPr>
+            <a:r>
+              <a:t/>
+            </a:r>
+            <a:endParaRPr/>
+          </a:p>
+          <a:p>
+            <a:pPr indent="0" lvl="0" marL="0" rtl="0" algn="l">
+              <a:spcBef>
+                <a:spcPts val="0"/>
+              </a:spcBef>
+              <a:spcAft>
+                <a:spcPts val="0"/>
+              </a:spcAft>
+              <a:buNone/>
+            </a:pPr>
+            <a:r>
+              <a:rPr lang="en-GB"/>
+              <a:t>&lt;Click&gt;</a:t>
+            </a:r>
+            <a:endParaRPr/>
+          </a:p>
+          <a:p>
+            <a:pPr indent="0" lvl="0" marL="0" rtl="0" algn="l">
+              <a:spcBef>
+                <a:spcPts val="0"/>
+              </a:spcBef>
+              <a:spcAft>
+                <a:spcPts val="0"/>
+              </a:spcAft>
+              <a:buNone/>
+            </a:pPr>
+            <a:r>
+              <a:rPr lang="en-GB"/>
+              <a:t>Once the data was understood, weekly entries for the summer season for the past three years were calculated.</a:t>
+            </a:r>
+            <a:endParaRPr/>
+          </a:p>
+          <a:p>
+            <a:pPr indent="0" lvl="0" marL="0" rtl="0" algn="l">
+              <a:spcBef>
+                <a:spcPts val="0"/>
+              </a:spcBef>
+              <a:spcAft>
+                <a:spcPts val="0"/>
+              </a:spcAft>
+              <a:buNone/>
+            </a:pPr>
+            <a:r>
+              <a:t/>
+            </a:r>
+            <a:endParaRPr/>
+          </a:p>
+          <a:p>
+            <a:pPr indent="0" lvl="0" marL="0" rtl="0" algn="l">
+              <a:spcBef>
+                <a:spcPts val="0"/>
+              </a:spcBef>
+              <a:spcAft>
+                <a:spcPts val="0"/>
+              </a:spcAft>
+              <a:buNone/>
+            </a:pPr>
+            <a:r>
+              <a:rPr lang="en-GB"/>
+              <a:t>&lt;Click&gt;</a:t>
+            </a:r>
+            <a:endParaRPr/>
+          </a:p>
+          <a:p>
+            <a:pPr indent="0" lvl="0" marL="0" rtl="0" algn="l">
+              <a:spcBef>
+                <a:spcPts val="0"/>
+              </a:spcBef>
+              <a:spcAft>
+                <a:spcPts val="0"/>
+              </a:spcAft>
+              <a:buNone/>
+            </a:pPr>
+            <a:r>
+              <a:rPr lang="en-GB"/>
+              <a:t>Also, weekly entries by year by station were calculated as well.</a:t>
+            </a:r>
+            <a:endParaRPr/>
+          </a:p>
+          <a:p>
+            <a:pPr indent="0" lvl="0" marL="0" rtl="0" algn="l">
+              <a:spcBef>
+                <a:spcPts val="0"/>
+              </a:spcBef>
+              <a:spcAft>
+                <a:spcPts val="0"/>
+              </a:spcAft>
+              <a:buNone/>
+            </a:pPr>
+            <a:r>
+              <a:t/>
+            </a:r>
+            <a:endParaRPr/>
+          </a:p>
+          <a:p>
+            <a:pPr indent="0" lvl="0" marL="0" rtl="0" algn="l">
+              <a:spcBef>
+                <a:spcPts val="0"/>
+              </a:spcBef>
+              <a:spcAft>
+                <a:spcPts val="0"/>
+              </a:spcAft>
+              <a:buNone/>
+            </a:pPr>
+            <a:r>
+              <a:rPr lang="en-GB"/>
+              <a:t>&lt;Click&gt; </a:t>
+            </a:r>
+            <a:r>
+              <a:rPr b="1" lang="en-GB"/>
+              <a:t>Tools</a:t>
+            </a:r>
+            <a:endParaRPr b="1"/>
+          </a:p>
+          <a:p>
+            <a:pPr indent="0" lvl="0" marL="0" rtl="0" algn="l">
+              <a:spcBef>
+                <a:spcPts val="0"/>
+              </a:spcBef>
+              <a:spcAft>
+                <a:spcPts val="0"/>
+              </a:spcAft>
+              <a:buNone/>
+            </a:pPr>
+            <a:r>
+              <a:rPr b="1" lang="en-GB"/>
+              <a:t>The following tools were used in this process:</a:t>
+            </a:r>
+            <a:endParaRPr b="1"/>
+          </a:p>
+          <a:p>
+            <a:pPr indent="0" lvl="0" marL="0" rtl="0" algn="l">
+              <a:spcBef>
+                <a:spcPts val="0"/>
+              </a:spcBef>
+              <a:spcAft>
+                <a:spcPts val="0"/>
+              </a:spcAft>
+              <a:buNone/>
+            </a:pPr>
+            <a:r>
+              <a:t/>
+            </a:r>
+            <a:endParaRPr/>
+          </a:p>
+          <a:p>
+            <a:pPr indent="0" lvl="0" marL="0" rtl="0" algn="l">
+              <a:spcBef>
+                <a:spcPts val="0"/>
+              </a:spcBef>
+              <a:spcAft>
+                <a:spcPts val="0"/>
+              </a:spcAft>
+              <a:buNone/>
+            </a:pPr>
+            <a:r>
+              <a:t/>
+            </a:r>
+            <a:endParaRPr/>
+          </a:p>
+          <a:p>
+            <a:pPr indent="0" lvl="0" marL="0" rtl="0" algn="l">
+              <a:spcBef>
+                <a:spcPts val="0"/>
+              </a:spcBef>
+              <a:spcAft>
+                <a:spcPts val="0"/>
+              </a:spcAft>
+              <a:buNone/>
+            </a:pPr>
+            <a:r>
               <a:t/>
             </a:r>
             <a:endParaRPr/>
@@ -1488,6 +1825,56 @@
             <a:noAutofit/>
           </a:bodyPr>
           <a:lstStyle/>
+          <a:p>
+            <a:pPr indent="0" lvl="0" marL="0" rtl="0" algn="l">
+              <a:spcBef>
+                <a:spcPts val="0"/>
+              </a:spcBef>
+              <a:spcAft>
+                <a:spcPts val="0"/>
+              </a:spcAft>
+              <a:buNone/>
+            </a:pPr>
+            <a:r>
+              <a:rPr lang="en-GB"/>
+              <a:t>Here are the interesting findings!</a:t>
+            </a:r>
+            <a:endParaRPr/>
+          </a:p>
+          <a:p>
+            <a:pPr indent="0" lvl="0" marL="0" rtl="0" algn="l">
+              <a:spcBef>
+                <a:spcPts val="0"/>
+              </a:spcBef>
+              <a:spcAft>
+                <a:spcPts val="0"/>
+              </a:spcAft>
+              <a:buNone/>
+            </a:pPr>
+            <a:br>
+              <a:rPr lang="en-GB"/>
+            </a:br>
+            <a:r>
+              <a:rPr lang="en-GB"/>
+              <a:t>This bar chart shows weekly entries for 2021 for the seven closest stations. As you can see, week 22 is the one with lowest volume.</a:t>
+            </a:r>
+            <a:endParaRPr/>
+          </a:p>
+          <a:p>
+            <a:pPr indent="0" lvl="0" marL="0" rtl="0" algn="l">
+              <a:spcBef>
+                <a:spcPts val="0"/>
+              </a:spcBef>
+              <a:spcAft>
+                <a:spcPts val="0"/>
+              </a:spcAft>
+              <a:buNone/>
+            </a:pPr>
+            <a:r>
+              <a:t/>
+            </a:r>
+            <a:endParaRPr/>
+          </a:p>
           <a:p>
             <a:pPr indent="0" lvl="0" marL="0" rtl="0" algn="l">
               <a:spcBef>
@@ -1598,7 +1985,125 @@
               <a:buNone/>
             </a:pPr>
             <a:r>
+              <a:rPr lang="en-GB"/>
+              <a:t>To </a:t>
+            </a:r>
+            <a:r>
+              <a:rPr lang="en-GB"/>
+              <a:t>further</a:t>
+            </a:r>
+            <a:r>
+              <a:rPr lang="en-GB"/>
+              <a:t> </a:t>
+            </a:r>
+            <a:r>
+              <a:rPr lang="en-GB"/>
+              <a:t>establish</a:t>
+            </a:r>
+            <a:r>
+              <a:rPr lang="en-GB"/>
+              <a:t> the pattern, data for 2019 and 2018 was explored as well.</a:t>
+            </a:r>
+            <a:endParaRPr/>
+          </a:p>
+          <a:p>
+            <a:pPr indent="0" lvl="0" marL="0" rtl="0" algn="l">
+              <a:spcBef>
+                <a:spcPts val="0"/>
+              </a:spcBef>
+              <a:spcAft>
+                <a:spcPts val="0"/>
+              </a:spcAft>
+              <a:buNone/>
+            </a:pPr>
+            <a:r>
               <a:t/>
+            </a:r>
+            <a:endParaRPr/>
+          </a:p>
+          <a:p>
+            <a:pPr indent="0" lvl="0" marL="0" rtl="0" algn="l">
+              <a:spcBef>
+                <a:spcPts val="0"/>
+              </a:spcBef>
+              <a:spcAft>
+                <a:spcPts val="0"/>
+              </a:spcAft>
+              <a:buNone/>
+            </a:pPr>
+            <a:r>
+              <a:rPr lang="en-GB"/>
+              <a:t>This bar chart shows weekly entries for the 7 </a:t>
+            </a:r>
+            <a:r>
+              <a:rPr lang="en-GB"/>
+              <a:t>closets</a:t>
+            </a:r>
+            <a:r>
+              <a:rPr lang="en-GB"/>
+              <a:t> stations to Barclays center for the year of 2021, 2019 and 2018.</a:t>
+            </a:r>
+            <a:endParaRPr/>
+          </a:p>
+          <a:p>
+            <a:pPr indent="0" lvl="0" marL="0" rtl="0" algn="l">
+              <a:spcBef>
+                <a:spcPts val="0"/>
+              </a:spcBef>
+              <a:spcAft>
+                <a:spcPts val="0"/>
+              </a:spcAft>
+              <a:buNone/>
+            </a:pPr>
+            <a:r>
+              <a:t/>
+            </a:r>
+            <a:endParaRPr/>
+          </a:p>
+          <a:p>
+            <a:pPr indent="0" lvl="0" marL="0" rtl="0" algn="l">
+              <a:spcBef>
+                <a:spcPts val="0"/>
+              </a:spcBef>
+              <a:spcAft>
+                <a:spcPts val="0"/>
+              </a:spcAft>
+              <a:buNone/>
+            </a:pPr>
+            <a:r>
+              <a:rPr lang="en-GB"/>
+              <a:t>Again, the Year 2020 data was not used due to pandemic.</a:t>
+            </a:r>
+            <a:endParaRPr/>
+          </a:p>
+          <a:p>
+            <a:pPr indent="0" lvl="0" marL="0" rtl="0" algn="l">
+              <a:spcBef>
+                <a:spcPts val="0"/>
+              </a:spcBef>
+              <a:spcAft>
+                <a:spcPts val="0"/>
+              </a:spcAft>
+              <a:buNone/>
+            </a:pPr>
+            <a:r>
+              <a:t/>
+            </a:r>
+            <a:endParaRPr/>
+          </a:p>
+          <a:p>
+            <a:pPr indent="0" lvl="0" marL="0" rtl="0" algn="l">
+              <a:spcBef>
+                <a:spcPts val="0"/>
+              </a:spcBef>
+              <a:spcAft>
+                <a:spcPts val="0"/>
+              </a:spcAft>
+              <a:buNone/>
+            </a:pPr>
+            <a:r>
+              <a:rPr lang="en-GB"/>
+              <a:t>As you can see, for all the three years, again it was week 22 with the lowest volume for all the three years. The next week with lowest volume was 27.</a:t>
             </a:r>
             <a:endParaRPr/>
           </a:p>
@@ -1697,7 +2202,47 @@
               <a:buNone/>
             </a:pPr>
             <a:r>
+              <a:rPr lang="en-GB"/>
+              <a:t>The line charts above show the weekly entries for three years for the 7 </a:t>
+            </a:r>
+            <a:r>
+              <a:rPr lang="en-GB"/>
+              <a:t>closets</a:t>
+            </a:r>
+            <a:r>
+              <a:rPr lang="en-GB"/>
+              <a:t> stations.</a:t>
+            </a:r>
+            <a:endParaRPr/>
+          </a:p>
+          <a:p>
+            <a:pPr indent="0" lvl="0" marL="0" rtl="0" algn="l">
+              <a:spcBef>
+                <a:spcPts val="0"/>
+              </a:spcBef>
+              <a:spcAft>
+                <a:spcPts val="0"/>
+              </a:spcAft>
+              <a:buNone/>
+            </a:pPr>
+            <a:r>
               <a:t/>
+            </a:r>
+            <a:endParaRPr/>
+          </a:p>
+          <a:p>
+            <a:pPr indent="0" lvl="0" marL="0" rtl="0" algn="l">
+              <a:spcBef>
+                <a:spcPts val="0"/>
+              </a:spcBef>
+              <a:spcAft>
+                <a:spcPts val="0"/>
+              </a:spcAft>
+              <a:buNone/>
+            </a:pPr>
+            <a:r>
+              <a:rPr lang="en-GB"/>
+              <a:t>As you can see, it is Atlantic Avenue station which has the lowest volume.</a:t>
             </a:r>
             <a:endParaRPr/>
           </a:p>
@@ -1823,7 +2368,7 @@
                   <a:schemeClr val="lt1"/>
                 </a:highlight>
               </a:rPr>
-              <a:t>lowest entry volume for stations near by Barclays center during first week of June.</a:t>
+              <a:t>lowest entry volume for stations near by Barclays center during first week of June which is week 22. Week 27th is the next best.</a:t>
             </a:r>
             <a:endParaRPr b="1" sz="1200">
               <a:solidFill>
@@ -1861,7 +2406,7 @@
                   <a:schemeClr val="lt1"/>
                 </a:highlight>
               </a:rPr>
-              <a:t>The best week to travel is first week of June ,This way kids can travel safely using MTA to attend the event.</a:t>
+              <a:t>Thus, the best week to travel is first week of June.</a:t>
             </a:r>
             <a:endParaRPr b="1" sz="1200">
               <a:solidFill>
@@ -1899,7 +2444,7 @@
                   <a:schemeClr val="lt1"/>
                 </a:highlight>
               </a:rPr>
-              <a:t>During this time  MTA can plan additional security during the time slots throughout the transit system.</a:t>
+              <a:t>Thus, MTA and New York school department can plan to schedule this event for the first week of June. They can also ensure additional security and add more trains as needed.</a:t>
             </a:r>
             <a:endParaRPr/>
           </a:p>
@@ -16727,7 +17272,7 @@
                 <a:cs typeface="Arial"/>
                 <a:sym typeface="Arial"/>
               </a:rPr>
-              <a:t>Sports Competition for middle school students at Barclays Center </a:t>
+              <a:t>Sports Competition for middle school students at Barclays Center for the year 2022</a:t>
             </a:r>
             <a:endParaRPr b="1" sz="1100">
               <a:solidFill>
@@ -18038,7 +18583,7 @@
         </p:nvSpPr>
         <p:spPr>
           <a:xfrm>
-            <a:off x="1303800" y="598575"/>
+            <a:off x="1303800" y="191750"/>
             <a:ext cx="7030500" cy="528000"/>
           </a:xfrm>
           <a:prstGeom prst="rect">
@@ -18089,7 +18634,7 @@
         </p:nvSpPr>
         <p:spPr>
           <a:xfrm>
-            <a:off x="1303800" y="1075450"/>
+            <a:off x="1303800" y="794550"/>
             <a:ext cx="7030500" cy="3943800"/>
           </a:xfrm>
           <a:prstGeom prst="rect">
@@ -18236,22 +18781,17 @@
             </a:endParaRPr>
           </a:p>
           <a:p>
-            <a:pPr indent="-285750" lvl="1" marL="914400" rtl="0" algn="l">
+            <a:pPr indent="0" lvl="0" marL="914400" rtl="0" algn="l">
               <a:lnSpc>
                 <a:spcPct val="95000"/>
               </a:lnSpc>
               <a:spcBef>
-                <a:spcPts val="0"/>
-              </a:spcBef>
-              <a:spcAft>
-                <a:spcPts val="0"/>
-              </a:spcAft>
-              <a:buClr>
-                <a:srgbClr val="674EA7"/>
-              </a:buClr>
-              <a:buSzPts val="900"/>
-              <a:buFont typeface="Arial"/>
-              <a:buAutoNum type="alphaLcPeriod"/>
+                <a:spcPts val="1200"/>
+              </a:spcBef>
+              <a:spcAft>
+                <a:spcPts val="0"/>
+              </a:spcAft>
+              <a:buNone/>
             </a:pPr>
             <a:r>
               <a:rPr b="1" lang="en-GB" sz="900">
@@ -18266,283 +18806,7 @@
                 <a:cs typeface="Arial"/>
                 <a:sym typeface="Arial"/>
               </a:rPr>
-              <a:t>ATLANTIC AV</a:t>
-            </a:r>
-            <a:endParaRPr b="1" sz="900">
-              <a:solidFill>
-                <a:srgbClr val="674EA7"/>
-              </a:solidFill>
-              <a:highlight>
-                <a:srgbClr val="FFFFFF"/>
-              </a:highlight>
-              <a:latin typeface="Arial"/>
-              <a:ea typeface="Arial"/>
-              <a:cs typeface="Arial"/>
-              <a:sym typeface="Arial"/>
-            </a:endParaRPr>
-          </a:p>
-          <a:p>
-            <a:pPr indent="-285750" lvl="1" marL="914400" rtl="0" algn="l">
-              <a:lnSpc>
-                <a:spcPct val="95000"/>
-              </a:lnSpc>
-              <a:spcBef>
-                <a:spcPts val="0"/>
-              </a:spcBef>
-              <a:spcAft>
-                <a:spcPts val="0"/>
-              </a:spcAft>
-              <a:buClr>
-                <a:srgbClr val="674EA7"/>
-              </a:buClr>
-              <a:buSzPts val="900"/>
-              <a:buFont typeface="Arial"/>
-              <a:buAutoNum type="alphaLcPeriod"/>
-            </a:pPr>
-            <a:r>
-              <a:rPr b="1" lang="en-GB" sz="900">
-                <a:solidFill>
-                  <a:srgbClr val="674EA7"/>
-                </a:solidFill>
-                <a:highlight>
-                  <a:srgbClr val="FFFFFF"/>
-                </a:highlight>
-                <a:latin typeface="Arial"/>
-                <a:ea typeface="Arial"/>
-                <a:cs typeface="Arial"/>
-                <a:sym typeface="Arial"/>
-              </a:rPr>
-              <a:t>FLATBUSH AV-B.C        </a:t>
-            </a:r>
-            <a:endParaRPr b="1" sz="900">
-              <a:solidFill>
-                <a:srgbClr val="674EA7"/>
-              </a:solidFill>
-              <a:highlight>
-                <a:srgbClr val="FFFFFF"/>
-              </a:highlight>
-              <a:latin typeface="Arial"/>
-              <a:ea typeface="Arial"/>
-              <a:cs typeface="Arial"/>
-              <a:sym typeface="Arial"/>
-            </a:endParaRPr>
-          </a:p>
-          <a:p>
-            <a:pPr indent="-285750" lvl="1" marL="914400" rtl="0" algn="l">
-              <a:lnSpc>
-                <a:spcPct val="95000"/>
-              </a:lnSpc>
-              <a:spcBef>
-                <a:spcPts val="0"/>
-              </a:spcBef>
-              <a:spcAft>
-                <a:spcPts val="0"/>
-              </a:spcAft>
-              <a:buClr>
-                <a:srgbClr val="674EA7"/>
-              </a:buClr>
-              <a:buSzPts val="900"/>
-              <a:buFont typeface="Arial"/>
-              <a:buAutoNum type="alphaLcPeriod"/>
-            </a:pPr>
-            <a:r>
-              <a:rPr b="1" lang="en-GB" sz="900">
-                <a:solidFill>
-                  <a:srgbClr val="674EA7"/>
-                </a:solidFill>
-                <a:highlight>
-                  <a:srgbClr val="FFFFFF"/>
-                </a:highlight>
-                <a:latin typeface="Arial"/>
-                <a:ea typeface="Arial"/>
-                <a:cs typeface="Arial"/>
-                <a:sym typeface="Arial"/>
-              </a:rPr>
-              <a:t>ATL AV-BARCLAY</a:t>
-            </a:r>
-            <a:endParaRPr b="1" sz="900">
-              <a:solidFill>
-                <a:srgbClr val="674EA7"/>
-              </a:solidFill>
-              <a:highlight>
-                <a:srgbClr val="FFFFFF"/>
-              </a:highlight>
-              <a:latin typeface="Arial"/>
-              <a:ea typeface="Arial"/>
-              <a:cs typeface="Arial"/>
-              <a:sym typeface="Arial"/>
-            </a:endParaRPr>
-          </a:p>
-          <a:p>
-            <a:pPr indent="-285750" lvl="1" marL="914400" rtl="0" algn="l">
-              <a:lnSpc>
-                <a:spcPct val="95000"/>
-              </a:lnSpc>
-              <a:spcBef>
-                <a:spcPts val="0"/>
-              </a:spcBef>
-              <a:spcAft>
-                <a:spcPts val="0"/>
-              </a:spcAft>
-              <a:buClr>
-                <a:srgbClr val="674EA7"/>
-              </a:buClr>
-              <a:buSzPts val="900"/>
-              <a:buFont typeface="Arial"/>
-              <a:buAutoNum type="alphaLcPeriod"/>
-            </a:pPr>
-            <a:r>
-              <a:rPr b="1" lang="en-GB" sz="900">
-                <a:solidFill>
-                  <a:srgbClr val="674EA7"/>
-                </a:solidFill>
-                <a:highlight>
-                  <a:srgbClr val="FFFFFF"/>
-                </a:highlight>
-                <a:latin typeface="Arial"/>
-                <a:ea typeface="Arial"/>
-                <a:cs typeface="Arial"/>
-                <a:sym typeface="Arial"/>
-              </a:rPr>
-              <a:t>25 AV</a:t>
-            </a:r>
-            <a:endParaRPr b="1" sz="900">
-              <a:solidFill>
-                <a:srgbClr val="674EA7"/>
-              </a:solidFill>
-              <a:highlight>
-                <a:srgbClr val="FFFFFF"/>
-              </a:highlight>
-              <a:latin typeface="Arial"/>
-              <a:ea typeface="Arial"/>
-              <a:cs typeface="Arial"/>
-              <a:sym typeface="Arial"/>
-            </a:endParaRPr>
-          </a:p>
-          <a:p>
-            <a:pPr indent="-285750" lvl="1" marL="914400" rtl="0" algn="l">
-              <a:lnSpc>
-                <a:spcPct val="95000"/>
-              </a:lnSpc>
-              <a:spcBef>
-                <a:spcPts val="0"/>
-              </a:spcBef>
-              <a:spcAft>
-                <a:spcPts val="0"/>
-              </a:spcAft>
-              <a:buClr>
-                <a:srgbClr val="674EA7"/>
-              </a:buClr>
-              <a:buSzPts val="900"/>
-              <a:buFont typeface="Arial"/>
-              <a:buAutoNum type="alphaLcPeriod"/>
-            </a:pPr>
-            <a:r>
-              <a:rPr b="1" lang="en-GB" sz="900">
-                <a:solidFill>
-                  <a:srgbClr val="674EA7"/>
-                </a:solidFill>
-                <a:highlight>
-                  <a:srgbClr val="FFFFFF"/>
-                </a:highlight>
-                <a:latin typeface="Arial"/>
-                <a:ea typeface="Arial"/>
-                <a:cs typeface="Arial"/>
-                <a:sym typeface="Arial"/>
-              </a:rPr>
-              <a:t>BERGEN ST</a:t>
-            </a:r>
-            <a:endParaRPr b="1" sz="900">
-              <a:solidFill>
-                <a:srgbClr val="674EA7"/>
-              </a:solidFill>
-              <a:highlight>
-                <a:srgbClr val="FFFFFF"/>
-              </a:highlight>
-              <a:latin typeface="Arial"/>
-              <a:ea typeface="Arial"/>
-              <a:cs typeface="Arial"/>
-              <a:sym typeface="Arial"/>
-            </a:endParaRPr>
-          </a:p>
-          <a:p>
-            <a:pPr indent="-285750" lvl="1" marL="914400" rtl="0" algn="l">
-              <a:lnSpc>
-                <a:spcPct val="95000"/>
-              </a:lnSpc>
-              <a:spcBef>
-                <a:spcPts val="0"/>
-              </a:spcBef>
-              <a:spcAft>
-                <a:spcPts val="0"/>
-              </a:spcAft>
-              <a:buClr>
-                <a:srgbClr val="674EA7"/>
-              </a:buClr>
-              <a:buSzPts val="900"/>
-              <a:buFont typeface="Arial"/>
-              <a:buAutoNum type="alphaLcPeriod"/>
-            </a:pPr>
-            <a:r>
-              <a:rPr b="1" lang="en-GB" sz="900">
-                <a:solidFill>
-                  <a:srgbClr val="674EA7"/>
-                </a:solidFill>
-                <a:highlight>
-                  <a:srgbClr val="FFFFFF"/>
-                </a:highlight>
-                <a:latin typeface="Arial"/>
-                <a:ea typeface="Arial"/>
-                <a:cs typeface="Arial"/>
-                <a:sym typeface="Arial"/>
-              </a:rPr>
-              <a:t>FULTON ST</a:t>
-            </a:r>
-            <a:endParaRPr b="1" sz="900">
-              <a:solidFill>
-                <a:srgbClr val="674EA7"/>
-              </a:solidFill>
-              <a:highlight>
-                <a:srgbClr val="FFFFFF"/>
-              </a:highlight>
-              <a:latin typeface="Arial"/>
-              <a:ea typeface="Arial"/>
-              <a:cs typeface="Arial"/>
-              <a:sym typeface="Arial"/>
-            </a:endParaRPr>
-          </a:p>
-          <a:p>
-            <a:pPr indent="-285750" lvl="1" marL="914400" rtl="0" algn="l">
-              <a:lnSpc>
-                <a:spcPct val="95000"/>
-              </a:lnSpc>
-              <a:spcBef>
-                <a:spcPts val="0"/>
-              </a:spcBef>
-              <a:spcAft>
-                <a:spcPts val="0"/>
-              </a:spcAft>
-              <a:buClr>
-                <a:srgbClr val="674EA7"/>
-              </a:buClr>
-              <a:buSzPts val="900"/>
-              <a:buFont typeface="Arial"/>
-              <a:buAutoNum type="alphaLcPeriod"/>
-            </a:pPr>
-            <a:r>
-              <a:rPr b="1" lang="en-GB" sz="900">
-                <a:solidFill>
-                  <a:srgbClr val="674EA7"/>
-                </a:solidFill>
-                <a:highlight>
-                  <a:srgbClr val="FFFFFF"/>
-                </a:highlight>
-                <a:latin typeface="Arial"/>
-                <a:ea typeface="Arial"/>
-                <a:cs typeface="Arial"/>
-                <a:sym typeface="Arial"/>
-              </a:rPr>
-              <a:t>LAFAYETTE AV</a:t>
+              <a:t>ATLANTIC AV,  FLATBUSH AV-B.C,  ATL AV-BARCLAY,  25 AV,  BERGEN ST,  FULTON ST,  LAFAYETTE AV</a:t>
             </a:r>
             <a:endParaRPr b="1" sz="900">
               <a:solidFill>
@@ -18629,7 +18893,7 @@
                 <a:cs typeface="Arial"/>
                 <a:sym typeface="Arial"/>
               </a:rPr>
-              <a:t>Explore MTA data to calculate weekly MTA Turnstile Entries for above stations.</a:t>
+              <a:t>Calculate weekly entries for summer season by year.</a:t>
             </a:r>
             <a:endParaRPr b="1">
               <a:solidFill>
@@ -18675,7 +18939,7 @@
                 <a:cs typeface="Arial"/>
                 <a:sym typeface="Arial"/>
               </a:rPr>
-              <a:t>Calculate weekly entries by above station.</a:t>
+              <a:t>Calculate weekly entries for summer season by year by station.</a:t>
             </a:r>
             <a:endParaRPr b="1">
               <a:solidFill>
@@ -18911,6 +19175,821 @@
   <p:clrMapOvr>
     <a:masterClrMapping/>
   </p:clrMapOvr>
+  <p:timing>
+    <p:tnLst>
+      <p:par>
+        <p:cTn dur="indefinite" nodeType="tmRoot" restart="never">
+          <p:childTnLst>
+            <p:seq concurrent="1" nextAc="seek">
+              <p:cTn dur="indefinite" id="2" nodeType="mainSeq">
+                <p:childTnLst>
+                  <p:par>
+                    <p:cTn fill="hold">
+                      <p:stCondLst>
+                        <p:cond delay="indefinite"/>
+                      </p:stCondLst>
+                      <p:childTnLst>
+                        <p:par>
+                          <p:cTn fill="hold">
+                            <p:stCondLst>
+                              <p:cond delay="0"/>
+                            </p:stCondLst>
+                            <p:childTnLst>
+                              <p:par>
+                                <p:cTn fill="hold" nodeType="clickEffect" presetClass="entr" presetID="10" presetSubtype="0">
+                                  <p:stCondLst>
+                                    <p:cond delay="0"/>
+                                  </p:stCondLst>
+                                  <p:childTnLst>
+                                    <p:set>
+                                      <p:cBhvr>
+                                        <p:cTn dur="1" fill="hold">
+                                          <p:stCondLst>
+                                            <p:cond delay="0"/>
+                                          </p:stCondLst>
+                                        </p:cTn>
+                                        <p:tgtEl>
+                                          <p:spTgt spid="291"/>
+                                        </p:tgtEl>
+                                        <p:attrNameLst>
+                                          <p:attrName>style.visibility</p:attrName>
+                                        </p:attrNameLst>
+                                      </p:cBhvr>
+                                      <p:to>
+                                        <p:strVal val="visible"/>
+                                      </p:to>
+                                    </p:set>
+                                    <p:animEffect filter="fade" transition="in">
+                                      <p:cBhvr>
+                                        <p:cTn dur="1000"/>
+                                        <p:tgtEl>
+                                          <p:spTgt spid="291"/>
+                                        </p:tgtEl>
+                                      </p:cBhvr>
+                                    </p:animEffect>
+                                  </p:childTnLst>
+                                </p:cTn>
+                              </p:par>
+                            </p:childTnLst>
+                          </p:cTn>
+                        </p:par>
+                      </p:childTnLst>
+                    </p:cTn>
+                  </p:par>
+                  <p:par>
+                    <p:cTn fill="hold">
+                      <p:stCondLst>
+                        <p:cond delay="indefinite"/>
+                      </p:stCondLst>
+                      <p:childTnLst>
+                        <p:par>
+                          <p:cTn fill="hold">
+                            <p:stCondLst>
+                              <p:cond delay="0"/>
+                            </p:stCondLst>
+                            <p:childTnLst>
+                              <p:par>
+                                <p:cTn fill="hold" nodeType="clickEffect" presetClass="entr" presetID="10" presetSubtype="0">
+                                  <p:stCondLst>
+                                    <p:cond delay="0"/>
+                                  </p:stCondLst>
+                                  <p:childTnLst>
+                                    <p:set>
+                                      <p:cBhvr>
+                                        <p:cTn dur="1" fill="hold">
+                                          <p:stCondLst>
+                                            <p:cond delay="0"/>
+                                          </p:stCondLst>
+                                        </p:cTn>
+                                        <p:tgtEl>
+                                          <p:spTgt spid="291">
+                                            <p:txEl>
+                                              <p:pRg end="0" st="0"/>
+                                            </p:txEl>
+                                          </p:spTgt>
+                                        </p:tgtEl>
+                                        <p:attrNameLst>
+                                          <p:attrName>style.visibility</p:attrName>
+                                        </p:attrNameLst>
+                                      </p:cBhvr>
+                                      <p:to>
+                                        <p:strVal val="visible"/>
+                                      </p:to>
+                                    </p:set>
+                                    <p:animEffect filter="fade" transition="in">
+                                      <p:cBhvr>
+                                        <p:cTn dur="1000"/>
+                                        <p:tgtEl>
+                                          <p:spTgt spid="291">
+                                            <p:txEl>
+                                              <p:pRg end="0" st="0"/>
+                                            </p:txEl>
+                                          </p:spTgt>
+                                        </p:tgtEl>
+                                      </p:cBhvr>
+                                    </p:animEffect>
+                                  </p:childTnLst>
+                                </p:cTn>
+                              </p:par>
+                            </p:childTnLst>
+                          </p:cTn>
+                        </p:par>
+                      </p:childTnLst>
+                    </p:cTn>
+                  </p:par>
+                  <p:par>
+                    <p:cTn fill="hold">
+                      <p:stCondLst>
+                        <p:cond delay="indefinite"/>
+                      </p:stCondLst>
+                      <p:childTnLst>
+                        <p:par>
+                          <p:cTn fill="hold">
+                            <p:stCondLst>
+                              <p:cond delay="0"/>
+                            </p:stCondLst>
+                            <p:childTnLst>
+                              <p:par>
+                                <p:cTn fill="hold" nodeType="clickEffect" presetClass="entr" presetID="10" presetSubtype="0">
+                                  <p:stCondLst>
+                                    <p:cond delay="0"/>
+                                  </p:stCondLst>
+                                  <p:childTnLst>
+                                    <p:set>
+                                      <p:cBhvr>
+                                        <p:cTn dur="1" fill="hold">
+                                          <p:stCondLst>
+                                            <p:cond delay="0"/>
+                                          </p:stCondLst>
+                                        </p:cTn>
+                                        <p:tgtEl>
+                                          <p:spTgt spid="291">
+                                            <p:txEl>
+                                              <p:pRg end="1" st="1"/>
+                                            </p:txEl>
+                                          </p:spTgt>
+                                        </p:tgtEl>
+                                        <p:attrNameLst>
+                                          <p:attrName>style.visibility</p:attrName>
+                                        </p:attrNameLst>
+                                      </p:cBhvr>
+                                      <p:to>
+                                        <p:strVal val="visible"/>
+                                      </p:to>
+                                    </p:set>
+                                    <p:animEffect filter="fade" transition="in">
+                                      <p:cBhvr>
+                                        <p:cTn dur="1000"/>
+                                        <p:tgtEl>
+                                          <p:spTgt spid="291">
+                                            <p:txEl>
+                                              <p:pRg end="1" st="1"/>
+                                            </p:txEl>
+                                          </p:spTgt>
+                                        </p:tgtEl>
+                                      </p:cBhvr>
+                                    </p:animEffect>
+                                  </p:childTnLst>
+                                </p:cTn>
+                              </p:par>
+                            </p:childTnLst>
+                          </p:cTn>
+                        </p:par>
+                      </p:childTnLst>
+                    </p:cTn>
+                  </p:par>
+                  <p:par>
+                    <p:cTn fill="hold">
+                      <p:stCondLst>
+                        <p:cond delay="indefinite"/>
+                      </p:stCondLst>
+                      <p:childTnLst>
+                        <p:par>
+                          <p:cTn fill="hold">
+                            <p:stCondLst>
+                              <p:cond delay="0"/>
+                            </p:stCondLst>
+                            <p:childTnLst>
+                              <p:par>
+                                <p:cTn fill="hold" nodeType="clickEffect" presetClass="entr" presetID="10" presetSubtype="0">
+                                  <p:stCondLst>
+                                    <p:cond delay="0"/>
+                                  </p:stCondLst>
+                                  <p:childTnLst>
+                                    <p:set>
+                                      <p:cBhvr>
+                                        <p:cTn dur="1" fill="hold">
+                                          <p:stCondLst>
+                                            <p:cond delay="0"/>
+                                          </p:stCondLst>
+                                        </p:cTn>
+                                        <p:tgtEl>
+                                          <p:spTgt spid="291">
+                                            <p:txEl>
+                                              <p:pRg end="2" st="2"/>
+                                            </p:txEl>
+                                          </p:spTgt>
+                                        </p:tgtEl>
+                                        <p:attrNameLst>
+                                          <p:attrName>style.visibility</p:attrName>
+                                        </p:attrNameLst>
+                                      </p:cBhvr>
+                                      <p:to>
+                                        <p:strVal val="visible"/>
+                                      </p:to>
+                                    </p:set>
+                                    <p:animEffect filter="fade" transition="in">
+                                      <p:cBhvr>
+                                        <p:cTn dur="1000"/>
+                                        <p:tgtEl>
+                                          <p:spTgt spid="291">
+                                            <p:txEl>
+                                              <p:pRg end="2" st="2"/>
+                                            </p:txEl>
+                                          </p:spTgt>
+                                        </p:tgtEl>
+                                      </p:cBhvr>
+                                    </p:animEffect>
+                                  </p:childTnLst>
+                                </p:cTn>
+                              </p:par>
+                            </p:childTnLst>
+                          </p:cTn>
+                        </p:par>
+                      </p:childTnLst>
+                    </p:cTn>
+                  </p:par>
+                  <p:par>
+                    <p:cTn fill="hold">
+                      <p:stCondLst>
+                        <p:cond delay="indefinite"/>
+                      </p:stCondLst>
+                      <p:childTnLst>
+                        <p:par>
+                          <p:cTn fill="hold">
+                            <p:stCondLst>
+                              <p:cond delay="0"/>
+                            </p:stCondLst>
+                            <p:childTnLst>
+                              <p:par>
+                                <p:cTn fill="hold" nodeType="clickEffect" presetClass="entr" presetID="10" presetSubtype="0">
+                                  <p:stCondLst>
+                                    <p:cond delay="0"/>
+                                  </p:stCondLst>
+                                  <p:childTnLst>
+                                    <p:set>
+                                      <p:cBhvr>
+                                        <p:cTn dur="1" fill="hold">
+                                          <p:stCondLst>
+                                            <p:cond delay="0"/>
+                                          </p:stCondLst>
+                                        </p:cTn>
+                                        <p:tgtEl>
+                                          <p:spTgt spid="291">
+                                            <p:txEl>
+                                              <p:pRg end="3" st="3"/>
+                                            </p:txEl>
+                                          </p:spTgt>
+                                        </p:tgtEl>
+                                        <p:attrNameLst>
+                                          <p:attrName>style.visibility</p:attrName>
+                                        </p:attrNameLst>
+                                      </p:cBhvr>
+                                      <p:to>
+                                        <p:strVal val="visible"/>
+                                      </p:to>
+                                    </p:set>
+                                    <p:animEffect filter="fade" transition="in">
+                                      <p:cBhvr>
+                                        <p:cTn dur="1000"/>
+                                        <p:tgtEl>
+                                          <p:spTgt spid="291">
+                                            <p:txEl>
+                                              <p:pRg end="3" st="3"/>
+                                            </p:txEl>
+                                          </p:spTgt>
+                                        </p:tgtEl>
+                                      </p:cBhvr>
+                                    </p:animEffect>
+                                  </p:childTnLst>
+                                </p:cTn>
+                              </p:par>
+                            </p:childTnLst>
+                          </p:cTn>
+                        </p:par>
+                      </p:childTnLst>
+                    </p:cTn>
+                  </p:par>
+                  <p:par>
+                    <p:cTn fill="hold">
+                      <p:stCondLst>
+                        <p:cond delay="indefinite"/>
+                      </p:stCondLst>
+                      <p:childTnLst>
+                        <p:par>
+                          <p:cTn fill="hold">
+                            <p:stCondLst>
+                              <p:cond delay="0"/>
+                            </p:stCondLst>
+                            <p:childTnLst>
+                              <p:par>
+                                <p:cTn fill="hold" nodeType="clickEffect" presetClass="entr" presetID="10" presetSubtype="0">
+                                  <p:stCondLst>
+                                    <p:cond delay="0"/>
+                                  </p:stCondLst>
+                                  <p:childTnLst>
+                                    <p:set>
+                                      <p:cBhvr>
+                                        <p:cTn dur="1" fill="hold">
+                                          <p:stCondLst>
+                                            <p:cond delay="0"/>
+                                          </p:stCondLst>
+                                        </p:cTn>
+                                        <p:tgtEl>
+                                          <p:spTgt spid="291">
+                                            <p:txEl>
+                                              <p:pRg end="4" st="4"/>
+                                            </p:txEl>
+                                          </p:spTgt>
+                                        </p:tgtEl>
+                                        <p:attrNameLst>
+                                          <p:attrName>style.visibility</p:attrName>
+                                        </p:attrNameLst>
+                                      </p:cBhvr>
+                                      <p:to>
+                                        <p:strVal val="visible"/>
+                                      </p:to>
+                                    </p:set>
+                                    <p:animEffect filter="fade" transition="in">
+                                      <p:cBhvr>
+                                        <p:cTn dur="1000"/>
+                                        <p:tgtEl>
+                                          <p:spTgt spid="291">
+                                            <p:txEl>
+                                              <p:pRg end="4" st="4"/>
+                                            </p:txEl>
+                                          </p:spTgt>
+                                        </p:tgtEl>
+                                      </p:cBhvr>
+                                    </p:animEffect>
+                                  </p:childTnLst>
+                                </p:cTn>
+                              </p:par>
+                            </p:childTnLst>
+                          </p:cTn>
+                        </p:par>
+                      </p:childTnLst>
+                    </p:cTn>
+                  </p:par>
+                  <p:par>
+                    <p:cTn fill="hold">
+                      <p:stCondLst>
+                        <p:cond delay="indefinite"/>
+                      </p:stCondLst>
+                      <p:childTnLst>
+                        <p:par>
+                          <p:cTn fill="hold">
+                            <p:stCondLst>
+                              <p:cond delay="0"/>
+                            </p:stCondLst>
+                            <p:childTnLst>
+                              <p:par>
+                                <p:cTn fill="hold" nodeType="clickEffect" presetClass="entr" presetID="10" presetSubtype="0">
+                                  <p:stCondLst>
+                                    <p:cond delay="0"/>
+                                  </p:stCondLst>
+                                  <p:childTnLst>
+                                    <p:set>
+                                      <p:cBhvr>
+                                        <p:cTn dur="1" fill="hold">
+                                          <p:stCondLst>
+                                            <p:cond delay="0"/>
+                                          </p:stCondLst>
+                                        </p:cTn>
+                                        <p:tgtEl>
+                                          <p:spTgt spid="291">
+                                            <p:txEl>
+                                              <p:pRg end="5" st="5"/>
+                                            </p:txEl>
+                                          </p:spTgt>
+                                        </p:tgtEl>
+                                        <p:attrNameLst>
+                                          <p:attrName>style.visibility</p:attrName>
+                                        </p:attrNameLst>
+                                      </p:cBhvr>
+                                      <p:to>
+                                        <p:strVal val="visible"/>
+                                      </p:to>
+                                    </p:set>
+                                    <p:animEffect filter="fade" transition="in">
+                                      <p:cBhvr>
+                                        <p:cTn dur="1000"/>
+                                        <p:tgtEl>
+                                          <p:spTgt spid="291">
+                                            <p:txEl>
+                                              <p:pRg end="5" st="5"/>
+                                            </p:txEl>
+                                          </p:spTgt>
+                                        </p:tgtEl>
+                                      </p:cBhvr>
+                                    </p:animEffect>
+                                  </p:childTnLst>
+                                </p:cTn>
+                              </p:par>
+                            </p:childTnLst>
+                          </p:cTn>
+                        </p:par>
+                      </p:childTnLst>
+                    </p:cTn>
+                  </p:par>
+                  <p:par>
+                    <p:cTn fill="hold">
+                      <p:stCondLst>
+                        <p:cond delay="indefinite"/>
+                      </p:stCondLst>
+                      <p:childTnLst>
+                        <p:par>
+                          <p:cTn fill="hold">
+                            <p:stCondLst>
+                              <p:cond delay="0"/>
+                            </p:stCondLst>
+                            <p:childTnLst>
+                              <p:par>
+                                <p:cTn fill="hold" nodeType="clickEffect" presetClass="entr" presetID="10" presetSubtype="0">
+                                  <p:stCondLst>
+                                    <p:cond delay="0"/>
+                                  </p:stCondLst>
+                                  <p:childTnLst>
+                                    <p:set>
+                                      <p:cBhvr>
+                                        <p:cTn dur="1" fill="hold">
+                                          <p:stCondLst>
+                                            <p:cond delay="0"/>
+                                          </p:stCondLst>
+                                        </p:cTn>
+                                        <p:tgtEl>
+                                          <p:spTgt spid="291">
+                                            <p:txEl>
+                                              <p:pRg end="6" st="6"/>
+                                            </p:txEl>
+                                          </p:spTgt>
+                                        </p:tgtEl>
+                                        <p:attrNameLst>
+                                          <p:attrName>style.visibility</p:attrName>
+                                        </p:attrNameLst>
+                                      </p:cBhvr>
+                                      <p:to>
+                                        <p:strVal val="visible"/>
+                                      </p:to>
+                                    </p:set>
+                                    <p:animEffect filter="fade" transition="in">
+                                      <p:cBhvr>
+                                        <p:cTn dur="1000"/>
+                                        <p:tgtEl>
+                                          <p:spTgt spid="291">
+                                            <p:txEl>
+                                              <p:pRg end="6" st="6"/>
+                                            </p:txEl>
+                                          </p:spTgt>
+                                        </p:tgtEl>
+                                      </p:cBhvr>
+                                    </p:animEffect>
+                                  </p:childTnLst>
+                                </p:cTn>
+                              </p:par>
+                            </p:childTnLst>
+                          </p:cTn>
+                        </p:par>
+                      </p:childTnLst>
+                    </p:cTn>
+                  </p:par>
+                  <p:par>
+                    <p:cTn fill="hold">
+                      <p:stCondLst>
+                        <p:cond delay="indefinite"/>
+                      </p:stCondLst>
+                      <p:childTnLst>
+                        <p:par>
+                          <p:cTn fill="hold">
+                            <p:stCondLst>
+                              <p:cond delay="0"/>
+                            </p:stCondLst>
+                            <p:childTnLst>
+                              <p:par>
+                                <p:cTn fill="hold" nodeType="clickEffect" presetClass="entr" presetID="10" presetSubtype="0">
+                                  <p:stCondLst>
+                                    <p:cond delay="0"/>
+                                  </p:stCondLst>
+                                  <p:childTnLst>
+                                    <p:set>
+                                      <p:cBhvr>
+                                        <p:cTn dur="1" fill="hold">
+                                          <p:stCondLst>
+                                            <p:cond delay="0"/>
+                                          </p:stCondLst>
+                                        </p:cTn>
+                                        <p:tgtEl>
+                                          <p:spTgt spid="291">
+                                            <p:txEl>
+                                              <p:pRg end="7" st="7"/>
+                                            </p:txEl>
+                                          </p:spTgt>
+                                        </p:tgtEl>
+                                        <p:attrNameLst>
+                                          <p:attrName>style.visibility</p:attrName>
+                                        </p:attrNameLst>
+                                      </p:cBhvr>
+                                      <p:to>
+                                        <p:strVal val="visible"/>
+                                      </p:to>
+                                    </p:set>
+                                    <p:animEffect filter="fade" transition="in">
+                                      <p:cBhvr>
+                                        <p:cTn dur="1000"/>
+                                        <p:tgtEl>
+                                          <p:spTgt spid="291">
+                                            <p:txEl>
+                                              <p:pRg end="7" st="7"/>
+                                            </p:txEl>
+                                          </p:spTgt>
+                                        </p:tgtEl>
+                                      </p:cBhvr>
+                                    </p:animEffect>
+                                  </p:childTnLst>
+                                </p:cTn>
+                              </p:par>
+                            </p:childTnLst>
+                          </p:cTn>
+                        </p:par>
+                      </p:childTnLst>
+                    </p:cTn>
+                  </p:par>
+                  <p:par>
+                    <p:cTn fill="hold">
+                      <p:stCondLst>
+                        <p:cond delay="indefinite"/>
+                      </p:stCondLst>
+                      <p:childTnLst>
+                        <p:par>
+                          <p:cTn fill="hold">
+                            <p:stCondLst>
+                              <p:cond delay="0"/>
+                            </p:stCondLst>
+                            <p:childTnLst>
+                              <p:par>
+                                <p:cTn fill="hold" nodeType="clickEffect" presetClass="entr" presetID="10" presetSubtype="0">
+                                  <p:stCondLst>
+                                    <p:cond delay="0"/>
+                                  </p:stCondLst>
+                                  <p:childTnLst>
+                                    <p:set>
+                                      <p:cBhvr>
+                                        <p:cTn dur="1" fill="hold">
+                                          <p:stCondLst>
+                                            <p:cond delay="0"/>
+                                          </p:stCondLst>
+                                        </p:cTn>
+                                        <p:tgtEl>
+                                          <p:spTgt spid="291">
+                                            <p:txEl>
+                                              <p:pRg end="8" st="8"/>
+                                            </p:txEl>
+                                          </p:spTgt>
+                                        </p:tgtEl>
+                                        <p:attrNameLst>
+                                          <p:attrName>style.visibility</p:attrName>
+                                        </p:attrNameLst>
+                                      </p:cBhvr>
+                                      <p:to>
+                                        <p:strVal val="visible"/>
+                                      </p:to>
+                                    </p:set>
+                                    <p:animEffect filter="fade" transition="in">
+                                      <p:cBhvr>
+                                        <p:cTn dur="1000"/>
+                                        <p:tgtEl>
+                                          <p:spTgt spid="291">
+                                            <p:txEl>
+                                              <p:pRg end="8" st="8"/>
+                                            </p:txEl>
+                                          </p:spTgt>
+                                        </p:tgtEl>
+                                      </p:cBhvr>
+                                    </p:animEffect>
+                                  </p:childTnLst>
+                                </p:cTn>
+                              </p:par>
+                            </p:childTnLst>
+                          </p:cTn>
+                        </p:par>
+                      </p:childTnLst>
+                    </p:cTn>
+                  </p:par>
+                  <p:par>
+                    <p:cTn fill="hold">
+                      <p:stCondLst>
+                        <p:cond delay="indefinite"/>
+                      </p:stCondLst>
+                      <p:childTnLst>
+                        <p:par>
+                          <p:cTn fill="hold">
+                            <p:stCondLst>
+                              <p:cond delay="0"/>
+                            </p:stCondLst>
+                            <p:childTnLst>
+                              <p:par>
+                                <p:cTn fill="hold" nodeType="clickEffect" presetClass="entr" presetID="10" presetSubtype="0">
+                                  <p:stCondLst>
+                                    <p:cond delay="0"/>
+                                  </p:stCondLst>
+                                  <p:childTnLst>
+                                    <p:set>
+                                      <p:cBhvr>
+                                        <p:cTn dur="1" fill="hold">
+                                          <p:stCondLst>
+                                            <p:cond delay="0"/>
+                                          </p:stCondLst>
+                                        </p:cTn>
+                                        <p:tgtEl>
+                                          <p:spTgt spid="291">
+                                            <p:txEl>
+                                              <p:pRg end="9" st="9"/>
+                                            </p:txEl>
+                                          </p:spTgt>
+                                        </p:tgtEl>
+                                        <p:attrNameLst>
+                                          <p:attrName>style.visibility</p:attrName>
+                                        </p:attrNameLst>
+                                      </p:cBhvr>
+                                      <p:to>
+                                        <p:strVal val="visible"/>
+                                      </p:to>
+                                    </p:set>
+                                    <p:animEffect filter="fade" transition="in">
+                                      <p:cBhvr>
+                                        <p:cTn dur="1000"/>
+                                        <p:tgtEl>
+                                          <p:spTgt spid="291">
+                                            <p:txEl>
+                                              <p:pRg end="9" st="9"/>
+                                            </p:txEl>
+                                          </p:spTgt>
+                                        </p:tgtEl>
+                                      </p:cBhvr>
+                                    </p:animEffect>
+                                  </p:childTnLst>
+                                </p:cTn>
+                              </p:par>
+                            </p:childTnLst>
+                          </p:cTn>
+                        </p:par>
+                      </p:childTnLst>
+                    </p:cTn>
+                  </p:par>
+                  <p:par>
+                    <p:cTn fill="hold">
+                      <p:stCondLst>
+                        <p:cond delay="indefinite"/>
+                      </p:stCondLst>
+                      <p:childTnLst>
+                        <p:par>
+                          <p:cTn fill="hold">
+                            <p:stCondLst>
+                              <p:cond delay="0"/>
+                            </p:stCondLst>
+                            <p:childTnLst>
+                              <p:par>
+                                <p:cTn fill="hold" nodeType="clickEffect" presetClass="entr" presetID="10" presetSubtype="0">
+                                  <p:stCondLst>
+                                    <p:cond delay="0"/>
+                                  </p:stCondLst>
+                                  <p:childTnLst>
+                                    <p:set>
+                                      <p:cBhvr>
+                                        <p:cTn dur="1" fill="hold">
+                                          <p:stCondLst>
+                                            <p:cond delay="0"/>
+                                          </p:stCondLst>
+                                        </p:cTn>
+                                        <p:tgtEl>
+                                          <p:spTgt spid="291">
+                                            <p:txEl>
+                                              <p:pRg end="10" st="10"/>
+                                            </p:txEl>
+                                          </p:spTgt>
+                                        </p:tgtEl>
+                                        <p:attrNameLst>
+                                          <p:attrName>style.visibility</p:attrName>
+                                        </p:attrNameLst>
+                                      </p:cBhvr>
+                                      <p:to>
+                                        <p:strVal val="visible"/>
+                                      </p:to>
+                                    </p:set>
+                                    <p:animEffect filter="fade" transition="in">
+                                      <p:cBhvr>
+                                        <p:cTn dur="1000"/>
+                                        <p:tgtEl>
+                                          <p:spTgt spid="291">
+                                            <p:txEl>
+                                              <p:pRg end="10" st="10"/>
+                                            </p:txEl>
+                                          </p:spTgt>
+                                        </p:tgtEl>
+                                      </p:cBhvr>
+                                    </p:animEffect>
+                                  </p:childTnLst>
+                                </p:cTn>
+                              </p:par>
+                            </p:childTnLst>
+                          </p:cTn>
+                        </p:par>
+                      </p:childTnLst>
+                    </p:cTn>
+                  </p:par>
+                  <p:par>
+                    <p:cTn fill="hold">
+                      <p:stCondLst>
+                        <p:cond delay="indefinite"/>
+                      </p:stCondLst>
+                      <p:childTnLst>
+                        <p:par>
+                          <p:cTn fill="hold">
+                            <p:stCondLst>
+                              <p:cond delay="0"/>
+                            </p:stCondLst>
+                            <p:childTnLst>
+                              <p:par>
+                                <p:cTn fill="hold" nodeType="clickEffect" presetClass="entr" presetID="10" presetSubtype="0">
+                                  <p:stCondLst>
+                                    <p:cond delay="0"/>
+                                  </p:stCondLst>
+                                  <p:childTnLst>
+                                    <p:set>
+                                      <p:cBhvr>
+                                        <p:cTn dur="1" fill="hold">
+                                          <p:stCondLst>
+                                            <p:cond delay="0"/>
+                                          </p:stCondLst>
+                                        </p:cTn>
+                                        <p:tgtEl>
+                                          <p:spTgt spid="291">
+                                            <p:txEl>
+                                              <p:pRg end="11" st="11"/>
+                                            </p:txEl>
+                                          </p:spTgt>
+                                        </p:tgtEl>
+                                        <p:attrNameLst>
+                                          <p:attrName>style.visibility</p:attrName>
+                                        </p:attrNameLst>
+                                      </p:cBhvr>
+                                      <p:to>
+                                        <p:strVal val="visible"/>
+                                      </p:to>
+                                    </p:set>
+                                    <p:animEffect filter="fade" transition="in">
+                                      <p:cBhvr>
+                                        <p:cTn dur="1000"/>
+                                        <p:tgtEl>
+                                          <p:spTgt spid="291">
+                                            <p:txEl>
+                                              <p:pRg end="11" st="11"/>
+                                            </p:txEl>
+                                          </p:spTgt>
+                                        </p:tgtEl>
+                                      </p:cBhvr>
+                                    </p:animEffect>
+                                  </p:childTnLst>
+                                </p:cTn>
+                              </p:par>
+                            </p:childTnLst>
+                          </p:cTn>
+                        </p:par>
+                      </p:childTnLst>
+                    </p:cTn>
+                  </p:par>
+                </p:childTnLst>
+              </p:cTn>
+              <p:prevCondLst>
+                <p:cond evt="onPrev">
+                  <p:tgtEl>
+                    <p:sldTgt/>
+                  </p:tgtEl>
+                </p:cond>
+              </p:prevCondLst>
+              <p:nextCondLst>
+                <p:cond evt="onNext">
+                  <p:tgtEl>
+                    <p:sldTgt/>
+                  </p:tgtEl>
+                </p:cond>
+              </p:nextCondLst>
+            </p:seq>
+          </p:childTnLst>
+        </p:cTn>
+      </p:par>
+    </p:tnLst>
+  </p:timing>
 </p:sld>
 </file>
 
@@ -18941,8 +20020,8 @@
         </p:nvSpPr>
         <p:spPr>
           <a:xfrm>
-            <a:off x="2350700" y="4531500"/>
-            <a:ext cx="7030500" cy="612000"/>
+            <a:off x="1749375" y="4453075"/>
+            <a:ext cx="6086100" cy="612000"/>
           </a:xfrm>
           <a:prstGeom prst="rect">
             <a:avLst/>
@@ -18979,7 +20058,7 @@
                 <a:cs typeface="Arial"/>
                 <a:sym typeface="Arial"/>
               </a:rPr>
-              <a:t>or year 2021 </a:t>
+              <a:t>or seven stations( year 2021) </a:t>
             </a:r>
             <a:endParaRPr sz="1800">
               <a:latin typeface="Arial"/>
@@ -18990,37 +20069,9 @@
           </a:p>
         </p:txBody>
       </p:sp>
-      <p:pic>
-        <p:nvPicPr>
-          <p:cNvPr id="297" name="Google Shape;297;p16"/>
-          <p:cNvPicPr preferRelativeResize="0"/>
-          <p:nvPr/>
-        </p:nvPicPr>
-        <p:blipFill>
-          <a:blip r:embed="rId3">
-            <a:alphaModFix/>
-          </a:blip>
-          <a:stretch>
-            <a:fillRect/>
-          </a:stretch>
-        </p:blipFill>
-        <p:spPr>
-          <a:xfrm>
-            <a:off x="1303800" y="1347550"/>
-            <a:ext cx="7108127" cy="2933776"/>
-          </a:xfrm>
-          <a:prstGeom prst="rect">
-            <a:avLst/>
-          </a:prstGeom>
-          <a:noFill/>
-          <a:ln>
-            <a:noFill/>
-          </a:ln>
-        </p:spPr>
-      </p:pic>
       <p:sp>
         <p:nvSpPr>
-          <p:cNvPr id="298" name="Google Shape;298;p16"/>
+          <p:cNvPr id="297" name="Google Shape;297;p16"/>
           <p:cNvSpPr txBox="1"/>
           <p:nvPr>
             <p:ph type="title"/>
@@ -19069,6 +20120,34 @@
           </a:p>
         </p:txBody>
       </p:sp>
+      <p:pic>
+        <p:nvPicPr>
+          <p:cNvPr id="298" name="Google Shape;298;p16"/>
+          <p:cNvPicPr preferRelativeResize="0"/>
+          <p:nvPr/>
+        </p:nvPicPr>
+        <p:blipFill>
+          <a:blip r:embed="rId3">
+            <a:alphaModFix/>
+          </a:blip>
+          <a:stretch>
+            <a:fillRect/>
+          </a:stretch>
+        </p:blipFill>
+        <p:spPr>
+          <a:xfrm>
+            <a:off x="1749375" y="1285900"/>
+            <a:ext cx="5534825" cy="3167175"/>
+          </a:xfrm>
+          <a:prstGeom prst="rect">
+            <a:avLst/>
+          </a:prstGeom>
+          <a:noFill/>
+          <a:ln>
+            <a:noFill/>
+          </a:ln>
+        </p:spPr>
+      </p:pic>
     </p:spTree>
   </p:cSld>
   <p:clrMapOvr>
@@ -19188,8 +20267,8 @@
         </p:blipFill>
         <p:spPr>
           <a:xfrm>
-            <a:off x="376350" y="143930"/>
-            <a:ext cx="9143999" cy="5122240"/>
+            <a:off x="85725" y="157163"/>
+            <a:ext cx="8972550" cy="4829175"/>
           </a:xfrm>
           <a:prstGeom prst="rect">
             <a:avLst/>
@@ -19241,8 +20320,8 @@
         </p:blipFill>
         <p:spPr>
           <a:xfrm>
-            <a:off x="2070775" y="89400"/>
-            <a:ext cx="4336676" cy="2364375"/>
+            <a:off x="0" y="0"/>
+            <a:ext cx="4814150" cy="1948100"/>
           </a:xfrm>
           <a:prstGeom prst="rect">
             <a:avLst/>
@@ -19269,8 +20348,8 @@
         </p:blipFill>
         <p:spPr>
           <a:xfrm>
-            <a:off x="4507725" y="2537951"/>
-            <a:ext cx="3658223" cy="2364376"/>
+            <a:off x="3884275" y="1008675"/>
+            <a:ext cx="5259725" cy="2106130"/>
           </a:xfrm>
           <a:prstGeom prst="rect">
             <a:avLst/>
@@ -19297,8 +20376,8 @@
         </p:blipFill>
         <p:spPr>
           <a:xfrm>
-            <a:off x="337150" y="2537950"/>
-            <a:ext cx="3468211" cy="2364374"/>
+            <a:off x="58100" y="3114800"/>
+            <a:ext cx="4911025" cy="2028700"/>
           </a:xfrm>
           <a:prstGeom prst="rect">
             <a:avLst/>
@@ -19526,6 +20605,285 @@
 </file>
 
 <file path=ppt/theme/theme1.xml><?xml version="1.0" encoding="utf-8"?>
+<a:theme xmlns:a="http://schemas.openxmlformats.org/drawingml/2006/main" xmlns:r="http://schemas.openxmlformats.org/officeDocument/2006/relationships" name="Momentum">
+  <a:themeElements>
+    <a:clrScheme name="Momentum">
+      <a:dk1>
+        <a:srgbClr val="C0791B"/>
+      </a:dk1>
+      <a:lt1>
+        <a:srgbClr val="FFFFFF"/>
+      </a:lt1>
+      <a:dk2>
+        <a:srgbClr val="424242"/>
+      </a:dk2>
+      <a:lt2>
+        <a:srgbClr val="8DD8D3"/>
+      </a:lt2>
+      <a:accent1>
+        <a:srgbClr val="0B6374"/>
+      </a:accent1>
+      <a:accent2>
+        <a:srgbClr val="FD5B58"/>
+      </a:accent2>
+      <a:accent3>
+        <a:srgbClr val="599191"/>
+      </a:accent3>
+      <a:accent4>
+        <a:srgbClr val="D7E6A3"/>
+      </a:accent4>
+      <a:accent5>
+        <a:srgbClr val="27278B"/>
+      </a:accent5>
+      <a:accent6>
+        <a:srgbClr val="D558AB"/>
+      </a:accent6>
+      <a:hlink>
+        <a:srgbClr val="27278B"/>
+      </a:hlink>
+      <a:folHlink>
+        <a:srgbClr val="27278B"/>
+      </a:folHlink>
+    </a:clrScheme>
+    <a:fontScheme name="Office">
+      <a:majorFont>
+        <a:latin typeface="Arial"/>
+        <a:ea typeface=""/>
+        <a:cs typeface=""/>
+        <a:font script="Jpan" typeface="ＭＳ Ｐゴシック"/>
+        <a:font script="Hang" typeface="맑은 고딕"/>
+        <a:font script="Hans" typeface="宋体"/>
+        <a:font script="Hant" typeface="新細明體"/>
+        <a:font script="Arab" typeface="Times New Roman"/>
+        <a:font script="Hebr" typeface="Times New Roman"/>
+        <a:font script="Thai" typeface="Angsana New"/>
+        <a:font script="Ethi" typeface="Nyala"/>
+        <a:font script="Beng" typeface="Vrinda"/>
+        <a:font script="Gujr" typeface="Shruti"/>
+        <a:font script="Khmr" typeface="MoolBoran"/>
+        <a:font script="Knda" typeface="Tunga"/>
+        <a:font script="Guru" typeface="Raavi"/>
+        <a:font script="Cans" typeface="Euphemia"/>
+        <a:font script="Cher" typeface="Plantagenet Cherokee"/>
+        <a:font script="Yiii" typeface="Microsoft Yi Baiti"/>
+        <a:font script="Tibt" typeface="Microsoft Himalaya"/>
+        <a:font script="Thaa" typeface="MV Boli"/>
+        <a:font script="Deva" typeface="Mangal"/>
+        <a:font script="Telu" typeface="Gautami"/>
+        <a:font script="Taml" typeface="Latha"/>
+        <a:font script="Syrc" typeface="Estrangelo Edessa"/>
+        <a:font script="Orya" typeface="Kalinga"/>
+        <a:font script="Mlym" typeface="Kartika"/>
+        <a:font script="Laoo" typeface="DokChampa"/>
+        <a:font script="Sinh" typeface="Iskoola Pota"/>
+        <a:font script="Mong" typeface="Mongolian Baiti"/>
+        <a:font script="Viet" typeface="Times New Roman"/>
+        <a:font script="Uigh" typeface="Microsoft Uighur"/>
+        <a:font script="Geor" typeface="Sylfaen"/>
+      </a:majorFont>
+      <a:minorFont>
+        <a:latin typeface="Arial"/>
+        <a:ea typeface=""/>
+        <a:cs typeface=""/>
+        <a:font script="Jpan" typeface="ＭＳ Ｐゴシック"/>
+        <a:font script="Hang" typeface="맑은 고딕"/>
+        <a:font script="Hans" typeface="宋体"/>
+        <a:font script="Hant" typeface="新細明體"/>
+        <a:font script="Arab" typeface="Arial"/>
+        <a:font script="Hebr" typeface="Arial"/>
+        <a:font script="Thai" typeface="Cordia New"/>
+        <a:font script="Ethi" typeface="Nyala"/>
+        <a:font script="Beng" typeface="Vrinda"/>
+        <a:font script="Gujr" typeface="Shruti"/>
+        <a:font script="Khmr" typeface="DaunPenh"/>
+        <a:font script="Knda" typeface="Tunga"/>
+        <a:font script="Guru" typeface="Raavi"/>
+        <a:font script="Cans" typeface="Euphemia"/>
+        <a:font script="Cher" typeface="Plantagenet Cherokee"/>
+        <a:font script="Yiii" typeface="Microsoft Yi Baiti"/>
+        <a:font script="Tibt" typeface="Microsoft Himalaya"/>
+        <a:font script="Thaa" typeface="MV Boli"/>
+        <a:font script="Deva" typeface="Mangal"/>
+        <a:font script="Telu" typeface="Gautami"/>
+        <a:font script="Taml" typeface="Latha"/>
+        <a:font script="Syrc" typeface="Estrangelo Edessa"/>
+        <a:font script="Orya" typeface="Kalinga"/>
+        <a:font script="Mlym" typeface="Kartika"/>
+        <a:font script="Laoo" typeface="DokChampa"/>
+        <a:font script="Sinh" typeface="Iskoola Pota"/>
+        <a:font script="Mong" typeface="Mongolian Baiti"/>
+        <a:font script="Viet" typeface="Arial"/>
+        <a:font script="Uigh" typeface="Microsoft Uighur"/>
+        <a:font script="Geor" typeface="Sylfaen"/>
+      </a:minorFont>
+    </a:fontScheme>
+    <a:fmtScheme name="Office">
+      <a:fillStyleLst>
+        <a:solidFill>
+          <a:schemeClr val="phClr"/>
+        </a:solidFill>
+        <a:gradFill rotWithShape="1">
+          <a:gsLst>
+            <a:gs pos="0">
+              <a:schemeClr val="phClr">
+                <a:tint val="50000"/>
+                <a:satMod val="300000"/>
+              </a:schemeClr>
+            </a:gs>
+            <a:gs pos="35000">
+              <a:schemeClr val="phClr">
+                <a:tint val="37000"/>
+                <a:satMod val="300000"/>
+              </a:schemeClr>
+            </a:gs>
+            <a:gs pos="100000">
+              <a:schemeClr val="phClr">
+                <a:tint val="15000"/>
+                <a:satMod val="350000"/>
+              </a:schemeClr>
+            </a:gs>
+          </a:gsLst>
+          <a:lin ang="16200000" scaled="1"/>
+        </a:gradFill>
+        <a:gradFill rotWithShape="1">
+          <a:gsLst>
+            <a:gs pos="0">
+              <a:schemeClr val="phClr">
+                <a:tint val="100000"/>
+                <a:shade val="100000"/>
+                <a:satMod val="130000"/>
+              </a:schemeClr>
+            </a:gs>
+            <a:gs pos="100000">
+              <a:schemeClr val="phClr">
+                <a:tint val="50000"/>
+                <a:shade val="100000"/>
+                <a:satMod val="350000"/>
+              </a:schemeClr>
+            </a:gs>
+          </a:gsLst>
+          <a:lin ang="16200000" scaled="0"/>
+        </a:gradFill>
+      </a:fillStyleLst>
+      <a:lnStyleLst>
+        <a:ln w="9525" cap="flat" cmpd="sng" algn="ctr">
+          <a:solidFill>
+            <a:schemeClr val="phClr">
+              <a:shade val="95000"/>
+              <a:satMod val="105000"/>
+            </a:schemeClr>
+          </a:solidFill>
+          <a:prstDash val="solid"/>
+        </a:ln>
+        <a:ln w="25400" cap="flat" cmpd="sng" algn="ctr">
+          <a:solidFill>
+            <a:schemeClr val="phClr"/>
+          </a:solidFill>
+          <a:prstDash val="solid"/>
+        </a:ln>
+        <a:ln w="38100" cap="flat" cmpd="sng" algn="ctr">
+          <a:solidFill>
+            <a:schemeClr val="phClr"/>
+          </a:solidFill>
+          <a:prstDash val="solid"/>
+        </a:ln>
+      </a:lnStyleLst>
+      <a:effectStyleLst>
+        <a:effectStyle>
+          <a:effectLst>
+            <a:outerShdw blurRad="40000" dist="20000" dir="5400000" rotWithShape="0">
+              <a:srgbClr val="000000">
+                <a:alpha val="38000"/>
+              </a:srgbClr>
+            </a:outerShdw>
+          </a:effectLst>
+        </a:effectStyle>
+        <a:effectStyle>
+          <a:effectLst>
+            <a:outerShdw blurRad="40000" dist="23000" dir="5400000" rotWithShape="0">
+              <a:srgbClr val="000000">
+                <a:alpha val="35000"/>
+              </a:srgbClr>
+            </a:outerShdw>
+          </a:effectLst>
+        </a:effectStyle>
+        <a:effectStyle>
+          <a:effectLst>
+            <a:outerShdw blurRad="40000" dist="23000" dir="5400000" rotWithShape="0">
+              <a:srgbClr val="000000">
+                <a:alpha val="35000"/>
+              </a:srgbClr>
+            </a:outerShdw>
+          </a:effectLst>
+          <a:scene3d>
+            <a:camera prst="orthographicFront">
+              <a:rot lat="0" lon="0" rev="0"/>
+            </a:camera>
+            <a:lightRig rig="threePt" dir="t">
+              <a:rot lat="0" lon="0" rev="1200000"/>
+            </a:lightRig>
+          </a:scene3d>
+          <a:sp3d>
+            <a:bevelT w="63500" h="25400"/>
+          </a:sp3d>
+        </a:effectStyle>
+      </a:effectStyleLst>
+      <a:bgFillStyleLst>
+        <a:solidFill>
+          <a:schemeClr val="phClr"/>
+        </a:solidFill>
+        <a:gradFill rotWithShape="1">
+          <a:gsLst>
+            <a:gs pos="0">
+              <a:schemeClr val="phClr">
+                <a:tint val="40000"/>
+                <a:satMod val="350000"/>
+              </a:schemeClr>
+            </a:gs>
+            <a:gs pos="40000">
+              <a:schemeClr val="phClr">
+                <a:tint val="45000"/>
+                <a:shade val="99000"/>
+                <a:satMod val="350000"/>
+              </a:schemeClr>
+            </a:gs>
+            <a:gs pos="100000">
+              <a:schemeClr val="phClr">
+                <a:shade val="20000"/>
+                <a:satMod val="255000"/>
+              </a:schemeClr>
+            </a:gs>
+          </a:gsLst>
+          <a:path path="circle">
+            <a:fillToRect l="50000" t="-80000" r="50000" b="180000"/>
+          </a:path>
+        </a:gradFill>
+        <a:gradFill rotWithShape="1">
+          <a:gsLst>
+            <a:gs pos="0">
+              <a:schemeClr val="phClr">
+                <a:tint val="80000"/>
+                <a:satMod val="300000"/>
+              </a:schemeClr>
+            </a:gs>
+            <a:gs pos="100000">
+              <a:schemeClr val="phClr">
+                <a:shade val="30000"/>
+                <a:satMod val="200000"/>
+              </a:schemeClr>
+            </a:gs>
+          </a:gsLst>
+          <a:path path="circle">
+            <a:fillToRect l="50000" t="50000" r="50000" b="50000"/>
+          </a:path>
+        </a:gradFill>
+      </a:bgFillStyleLst>
+    </a:fmtScheme>
+  </a:themeElements>
+</a:theme>
+</file>
+
+<file path=ppt/theme/theme2.xml><?xml version="1.0" encoding="utf-8"?>
 <a:theme xmlns:a="http://schemas.openxmlformats.org/drawingml/2006/main" xmlns:r="http://schemas.openxmlformats.org/officeDocument/2006/relationships">
   <a:themeElements>
     <a:clrScheme name="Default">
@@ -19802,283 +21160,4 @@
     </a:fmtScheme>
   </a:themeElements>
 </a:theme>
-</file>
-
-<file path=ppt/theme/theme2.xml><?xml version="1.0" encoding="utf-8"?>
-<a:theme xmlns:a="http://schemas.openxmlformats.org/drawingml/2006/main" xmlns:r="http://schemas.openxmlformats.org/officeDocument/2006/relationships" name="Momentum">
-  <a:themeElements>
-    <a:clrScheme name="Momentum">
-      <a:dk1>
-        <a:srgbClr val="C0791B"/>
-      </a:dk1>
-      <a:lt1>
-        <a:srgbClr val="FFFFFF"/>
-      </a:lt1>
-      <a:dk2>
-        <a:srgbClr val="424242"/>
-      </a:dk2>
-      <a:lt2>
-        <a:srgbClr val="8DD8D3"/>
-      </a:lt2>
-      <a:accent1>
-        <a:srgbClr val="0B6374"/>
-      </a:accent1>
-      <a:accent2>
-        <a:srgbClr val="FD5B58"/>
-      </a:accent2>
-      <a:accent3>
-        <a:srgbClr val="599191"/>
-      </a:accent3>
-      <a:accent4>
-        <a:srgbClr val="D7E6A3"/>
-      </a:accent4>
-      <a:accent5>
-        <a:srgbClr val="27278B"/>
-      </a:accent5>
-      <a:accent6>
-        <a:srgbClr val="D558AB"/>
-      </a:accent6>
-      <a:hlink>
-        <a:srgbClr val="27278B"/>
-      </a:hlink>
-      <a:folHlink>
-        <a:srgbClr val="27278B"/>
-      </a:folHlink>
-    </a:clrScheme>
-    <a:fontScheme name="Office">
-      <a:majorFont>
-        <a:latin typeface="Arial"/>
-        <a:ea typeface=""/>
-        <a:cs typeface=""/>
-        <a:font script="Jpan" typeface="ＭＳ Ｐゴシック"/>
-        <a:font script="Hang" typeface="맑은 고딕"/>
-        <a:font script="Hans" typeface="宋体"/>
-        <a:font script="Hant" typeface="新細明體"/>
-        <a:font script="Arab" typeface="Times New Roman"/>
-        <a:font script="Hebr" typeface="Times New Roman"/>
-        <a:font script="Thai" typeface="Angsana New"/>
-        <a:font script="Ethi" typeface="Nyala"/>
-        <a:font script="Beng" typeface="Vrinda"/>
-        <a:font script="Gujr" typeface="Shruti"/>
-        <a:font script="Khmr" typeface="MoolBoran"/>
-        <a:font script="Knda" typeface="Tunga"/>
-        <a:font script="Guru" typeface="Raavi"/>
-        <a:font script="Cans" typeface="Euphemia"/>
-        <a:font script="Cher" typeface="Plantagenet Cherokee"/>
-        <a:font script="Yiii" typeface="Microsoft Yi Baiti"/>
-        <a:font script="Tibt" typeface="Microsoft Himalaya"/>
-        <a:font script="Thaa" typeface="MV Boli"/>
-        <a:font script="Deva" typeface="Mangal"/>
-        <a:font script="Telu" typeface="Gautami"/>
-        <a:font script="Taml" typeface="Latha"/>
-        <a:font script="Syrc" typeface="Estrangelo Edessa"/>
-        <a:font script="Orya" typeface="Kalinga"/>
-        <a:font script="Mlym" typeface="Kartika"/>
-        <a:font script="Laoo" typeface="DokChampa"/>
-        <a:font script="Sinh" typeface="Iskoola Pota"/>
-        <a:font script="Mong" typeface="Mongolian Baiti"/>
-        <a:font script="Viet" typeface="Times New Roman"/>
-        <a:font script="Uigh" typeface="Microsoft Uighur"/>
-        <a:font script="Geor" typeface="Sylfaen"/>
-      </a:majorFont>
-      <a:minorFont>
-        <a:latin typeface="Arial"/>
-        <a:ea typeface=""/>
-        <a:cs typeface=""/>
-        <a:font script="Jpan" typeface="ＭＳ Ｐゴシック"/>
-        <a:font script="Hang" typeface="맑은 고딕"/>
-        <a:font script="Hans" typeface="宋体"/>
-        <a:font script="Hant" typeface="新細明體"/>
-        <a:font script="Arab" typeface="Arial"/>
-        <a:font script="Hebr" typeface="Arial"/>
-        <a:font script="Thai" typeface="Cordia New"/>
-        <a:font script="Ethi" typeface="Nyala"/>
-        <a:font script="Beng" typeface="Vrinda"/>
-        <a:font script="Gujr" typeface="Shruti"/>
-        <a:font script="Khmr" typeface="DaunPenh"/>
-        <a:font script="Knda" typeface="Tunga"/>
-        <a:font script="Guru" typeface="Raavi"/>
-        <a:font script="Cans" typeface="Euphemia"/>
-        <a:font script="Cher" typeface="Plantagenet Cherokee"/>
-        <a:font script="Yiii" typeface="Microsoft Yi Baiti"/>
-        <a:font script="Tibt" typeface="Microsoft Himalaya"/>
-        <a:font script="Thaa" typeface="MV Boli"/>
-        <a:font script="Deva" typeface="Mangal"/>
-        <a:font script="Telu" typeface="Gautami"/>
-        <a:font script="Taml" typeface="Latha"/>
-        <a:font script="Syrc" typeface="Estrangelo Edessa"/>
-        <a:font script="Orya" typeface="Kalinga"/>
-        <a:font script="Mlym" typeface="Kartika"/>
-        <a:font script="Laoo" typeface="DokChampa"/>
-        <a:font script="Sinh" typeface="Iskoola Pota"/>
-        <a:font script="Mong" typeface="Mongolian Baiti"/>
-        <a:font script="Viet" typeface="Arial"/>
-        <a:font script="Uigh" typeface="Microsoft Uighur"/>
-        <a:font script="Geor" typeface="Sylfaen"/>
-      </a:minorFont>
-    </a:fontScheme>
-    <a:fmtScheme name="Office">
-      <a:fillStyleLst>
-        <a:solidFill>
-          <a:schemeClr val="phClr"/>
-        </a:solidFill>
-        <a:gradFill rotWithShape="1">
-          <a:gsLst>
-            <a:gs pos="0">
-              <a:schemeClr val="phClr">
-                <a:tint val="50000"/>
-                <a:satMod val="300000"/>
-              </a:schemeClr>
-            </a:gs>
-            <a:gs pos="35000">
-              <a:schemeClr val="phClr">
-                <a:tint val="37000"/>
-                <a:satMod val="300000"/>
-              </a:schemeClr>
-            </a:gs>
-            <a:gs pos="100000">
-              <a:schemeClr val="phClr">
-                <a:tint val="15000"/>
-                <a:satMod val="350000"/>
-              </a:schemeClr>
-            </a:gs>
-          </a:gsLst>
-          <a:lin ang="16200000" scaled="1"/>
-        </a:gradFill>
-        <a:gradFill rotWithShape="1">
-          <a:gsLst>
-            <a:gs pos="0">
-              <a:schemeClr val="phClr">
-                <a:tint val="100000"/>
-                <a:shade val="100000"/>
-                <a:satMod val="130000"/>
-              </a:schemeClr>
-            </a:gs>
-            <a:gs pos="100000">
-              <a:schemeClr val="phClr">
-                <a:tint val="50000"/>
-                <a:shade val="100000"/>
-                <a:satMod val="350000"/>
-              </a:schemeClr>
-            </a:gs>
-          </a:gsLst>
-          <a:lin ang="16200000" scaled="0"/>
-        </a:gradFill>
-      </a:fillStyleLst>
-      <a:lnStyleLst>
-        <a:ln w="9525" cap="flat" cmpd="sng" algn="ctr">
-          <a:solidFill>
-            <a:schemeClr val="phClr">
-              <a:shade val="95000"/>
-              <a:satMod val="105000"/>
-            </a:schemeClr>
-          </a:solidFill>
-          <a:prstDash val="solid"/>
-        </a:ln>
-        <a:ln w="25400" cap="flat" cmpd="sng" algn="ctr">
-          <a:solidFill>
-            <a:schemeClr val="phClr"/>
-          </a:solidFill>
-          <a:prstDash val="solid"/>
-        </a:ln>
-        <a:ln w="38100" cap="flat" cmpd="sng" algn="ctr">
-          <a:solidFill>
-            <a:schemeClr val="phClr"/>
-          </a:solidFill>
-          <a:prstDash val="solid"/>
-        </a:ln>
-      </a:lnStyleLst>
-      <a:effectStyleLst>
-        <a:effectStyle>
-          <a:effectLst>
-            <a:outerShdw blurRad="40000" dist="20000" dir="5400000" rotWithShape="0">
-              <a:srgbClr val="000000">
-                <a:alpha val="38000"/>
-              </a:srgbClr>
-            </a:outerShdw>
-          </a:effectLst>
-        </a:effectStyle>
-        <a:effectStyle>
-          <a:effectLst>
-            <a:outerShdw blurRad="40000" dist="23000" dir="5400000" rotWithShape="0">
-              <a:srgbClr val="000000">
-                <a:alpha val="35000"/>
-              </a:srgbClr>
-            </a:outerShdw>
-          </a:effectLst>
-        </a:effectStyle>
-        <a:effectStyle>
-          <a:effectLst>
-            <a:outerShdw blurRad="40000" dist="23000" dir="5400000" rotWithShape="0">
-              <a:srgbClr val="000000">
-                <a:alpha val="35000"/>
-              </a:srgbClr>
-            </a:outerShdw>
-          </a:effectLst>
-          <a:scene3d>
-            <a:camera prst="orthographicFront">
-              <a:rot lat="0" lon="0" rev="0"/>
-            </a:camera>
-            <a:lightRig rig="threePt" dir="t">
-              <a:rot lat="0" lon="0" rev="1200000"/>
-            </a:lightRig>
-          </a:scene3d>
-          <a:sp3d>
-            <a:bevelT w="63500" h="25400"/>
-          </a:sp3d>
-        </a:effectStyle>
-      </a:effectStyleLst>
-      <a:bgFillStyleLst>
-        <a:solidFill>
-          <a:schemeClr val="phClr"/>
-        </a:solidFill>
-        <a:gradFill rotWithShape="1">
-          <a:gsLst>
-            <a:gs pos="0">
-              <a:schemeClr val="phClr">
-                <a:tint val="40000"/>
-                <a:satMod val="350000"/>
-              </a:schemeClr>
-            </a:gs>
-            <a:gs pos="40000">
-              <a:schemeClr val="phClr">
-                <a:tint val="45000"/>
-                <a:shade val="99000"/>
-                <a:satMod val="350000"/>
-              </a:schemeClr>
-            </a:gs>
-            <a:gs pos="100000">
-              <a:schemeClr val="phClr">
-                <a:shade val="20000"/>
-                <a:satMod val="255000"/>
-              </a:schemeClr>
-            </a:gs>
-          </a:gsLst>
-          <a:path path="circle">
-            <a:fillToRect l="50000" t="-80000" r="50000" b="180000"/>
-          </a:path>
-        </a:gradFill>
-        <a:gradFill rotWithShape="1">
-          <a:gsLst>
-            <a:gs pos="0">
-              <a:schemeClr val="phClr">
-                <a:tint val="80000"/>
-                <a:satMod val="300000"/>
-              </a:schemeClr>
-            </a:gs>
-            <a:gs pos="100000">
-              <a:schemeClr val="phClr">
-                <a:shade val="30000"/>
-                <a:satMod val="200000"/>
-              </a:schemeClr>
-            </a:gs>
-          </a:gsLst>
-          <a:path path="circle">
-            <a:fillToRect l="50000" t="50000" r="50000" b="50000"/>
-          </a:path>
-        </a:gradFill>
-      </a:bgFillStyleLst>
-    </a:fmtScheme>
-  </a:themeElements>
-</a:theme>
 </file>
</xml_diff>